<commit_message>
ITAT slides with QR codes
</commit_message>
<xml_diff>
--- a/papers/2025-ITAT-slides.pptx
+++ b/papers/2025-ITAT-slides.pptx
@@ -281,7 +281,7 @@
   <p:extLst>
     <p:ext uri="{EFAFB233-063F-42B5-8137-9DF3F51BA10A}">
       <p15:sldGuideLst xmlns:p15="http://schemas.microsoft.com/office/powerpoint/2012/main">
-        <p15:guide id="1" orient="horz" pos="2210" userDrawn="1">
+        <p15:guide id="1" orient="horz" pos="3208" userDrawn="1">
           <p15:clr>
             <a:srgbClr val="A4A3A4"/>
           </p15:clr>
@@ -7868,7 +7868,7 @@
           <a:graphicData uri="http://schemas.openxmlformats.org/presentationml/2006/ole">
             <mc:AlternateContent xmlns:mc="http://schemas.openxmlformats.org/markup-compatibility/2006">
               <mc:Choice xmlns:v="urn:schemas-microsoft-com:vml" Requires="v">
-                <p:oleObj spid="_x0000_s1132" name="Acrobat Document" r:id="rId6" imgW="4400418" imgH="2533650" progId="AcroExch.Document.DC">
+                <p:oleObj spid="_x0000_s1136" name="Acrobat Document" r:id="rId6" imgW="4400418" imgH="2533650" progId="AcroExch.Document.DC">
                   <p:embed/>
                 </p:oleObj>
               </mc:Choice>
@@ -7937,48 +7937,6 @@
       </p:grpSpPr>
       <p:sp>
         <p:nvSpPr>
-          <p:cNvPr id="58" name="Google Shape;58;p10"/>
-          <p:cNvSpPr txBox="1">
-            <a:spLocks noGrp="1"/>
-          </p:cNvSpPr>
-          <p:nvPr>
-            <p:ph type="sldNum" idx="12"/>
-          </p:nvPr>
-        </p:nvSpPr>
-        <p:spPr>
-          <a:xfrm>
-            <a:off x="8595300" y="4920297"/>
-            <a:ext cx="548700" cy="223200"/>
-          </a:xfrm>
-          <a:prstGeom prst="rect">
-            <a:avLst/>
-          </a:prstGeom>
-        </p:spPr>
-        <p:txBody>
-          <a:bodyPr spcFirstLastPara="1" wrap="square" lIns="91425" tIns="45700" rIns="91425" bIns="45700" anchor="ctr" anchorCtr="0">
-            <a:noAutofit/>
-          </a:bodyPr>
-          <a:lstStyle/>
-          <a:p>
-            <a:pPr marL="0" lvl="0" indent="0" algn="r" rtl="0">
-              <a:spcBef>
-                <a:spcPts val="0"/>
-              </a:spcBef>
-              <a:spcAft>
-                <a:spcPts val="0"/>
-              </a:spcAft>
-              <a:buNone/>
-            </a:pPr>
-            <a:fld id="{00000000-1234-1234-1234-123412341234}" type="slidenum">
-              <a:rPr lang="en-US" smtClean="0"/>
-              <a:t>10</a:t>
-            </a:fld>
-            <a:endParaRPr lang="en-US" dirty="0"/>
-          </a:p>
-        </p:txBody>
-      </p:sp>
-      <p:sp>
-        <p:nvSpPr>
           <p:cNvPr id="59" name="Google Shape;59;p10"/>
           <p:cNvSpPr txBox="1">
             <a:spLocks noGrp="1"/>
@@ -8042,7 +8000,7 @@
         </p:blipFill>
         <p:spPr bwMode="auto">
           <a:xfrm>
-            <a:off x="1143000" y="671513"/>
+            <a:off x="827584" y="671513"/>
             <a:ext cx="6858000" cy="3800475"/>
           </a:xfrm>
           <a:prstGeom prst="rect">
@@ -8081,7 +8039,7 @@
         </p:nvSpPr>
         <p:spPr>
           <a:xfrm>
-            <a:off x="3995936" y="4856261"/>
+            <a:off x="4355976" y="4856261"/>
             <a:ext cx="4824536" cy="307777"/>
           </a:xfrm>
           <a:prstGeom prst="rect">
@@ -8212,6 +8170,30 @@
           </a:p>
         </p:txBody>
       </p:sp>
+      <p:pic>
+        <p:nvPicPr>
+          <p:cNvPr id="10" name="Picture 9"/>
+          <p:cNvPicPr>
+            <a:picLocks noChangeAspect="1"/>
+          </p:cNvPicPr>
+          <p:nvPr/>
+        </p:nvPicPr>
+        <p:blipFill>
+          <a:blip r:embed="rId5"/>
+          <a:stretch>
+            <a:fillRect/>
+          </a:stretch>
+        </p:blipFill>
+        <p:spPr>
+          <a:xfrm>
+            <a:off x="7596336" y="3361208"/>
+            <a:ext cx="1495053" cy="1495053"/>
+          </a:xfrm>
+          <a:prstGeom prst="rect">
+            <a:avLst/>
+          </a:prstGeom>
+        </p:spPr>
+      </p:pic>
     </p:spTree>
     <p:extLst>
       <p:ext uri="{BB962C8B-B14F-4D97-AF65-F5344CB8AC3E}">
@@ -8249,48 +8231,30 @@
           <a:chExt cx="0" cy="0"/>
         </a:xfrm>
       </p:grpSpPr>
-      <p:sp>
-        <p:nvSpPr>
-          <p:cNvPr id="58" name="Google Shape;58;p10"/>
-          <p:cNvSpPr txBox="1">
-            <a:spLocks noGrp="1"/>
-          </p:cNvSpPr>
-          <p:nvPr>
-            <p:ph type="sldNum" idx="12"/>
-          </p:nvPr>
-        </p:nvSpPr>
+      <p:pic>
+        <p:nvPicPr>
+          <p:cNvPr id="10" name="Picture 9"/>
+          <p:cNvPicPr>
+            <a:picLocks noChangeAspect="1"/>
+          </p:cNvPicPr>
+          <p:nvPr/>
+        </p:nvPicPr>
+        <p:blipFill>
+          <a:blip r:embed="rId3"/>
+          <a:stretch>
+            <a:fillRect/>
+          </a:stretch>
+        </p:blipFill>
         <p:spPr>
           <a:xfrm>
-            <a:off x="8595300" y="4920297"/>
-            <a:ext cx="548700" cy="223200"/>
+            <a:off x="7596336" y="3361208"/>
+            <a:ext cx="1495053" cy="1495053"/>
           </a:xfrm>
           <a:prstGeom prst="rect">
             <a:avLst/>
           </a:prstGeom>
         </p:spPr>
-        <p:txBody>
-          <a:bodyPr spcFirstLastPara="1" wrap="square" lIns="91425" tIns="45700" rIns="91425" bIns="45700" anchor="ctr" anchorCtr="0">
-            <a:noAutofit/>
-          </a:bodyPr>
-          <a:lstStyle/>
-          <a:p>
-            <a:pPr marL="0" lvl="0" indent="0" algn="r" rtl="0">
-              <a:spcBef>
-                <a:spcPts val="0"/>
-              </a:spcBef>
-              <a:spcAft>
-                <a:spcPts val="0"/>
-              </a:spcAft>
-              <a:buNone/>
-            </a:pPr>
-            <a:fld id="{00000000-1234-1234-1234-123412341234}" type="slidenum">
-              <a:rPr lang="en-US" smtClean="0"/>
-              <a:t>11</a:t>
-            </a:fld>
-            <a:endParaRPr lang="en-US" dirty="0"/>
-          </a:p>
-        </p:txBody>
-      </p:sp>
+      </p:pic>
       <p:sp>
         <p:nvSpPr>
           <p:cNvPr id="59" name="Google Shape;59;p10"/>
@@ -8342,7 +8306,7 @@
           <p:nvPr/>
         </p:nvPicPr>
         <p:blipFill>
-          <a:blip r:embed="rId3">
+          <a:blip r:embed="rId4">
             <a:extLst>
               <a:ext uri="{28A0092B-C50C-407E-A947-70E740481C1C}">
                 <a14:useLocalDpi xmlns:a14="http://schemas.microsoft.com/office/drawing/2010/main" val="0"/>
@@ -8356,7 +8320,7 @@
         </p:blipFill>
         <p:spPr bwMode="auto">
           <a:xfrm>
-            <a:off x="1143000" y="671513"/>
+            <a:off x="827584" y="671513"/>
             <a:ext cx="6858000" cy="3800475"/>
           </a:xfrm>
           <a:prstGeom prst="rect">
@@ -8395,7 +8359,7 @@
         </p:nvSpPr>
         <p:spPr>
           <a:xfrm>
-            <a:off x="3995936" y="4856261"/>
+            <a:off x="4355976" y="4856261"/>
             <a:ext cx="4824536" cy="307777"/>
           </a:xfrm>
           <a:prstGeom prst="rect">
@@ -8422,7 +8386,7 @@
                 <a:latin typeface="Open Sans" panose="020B0604020202020204" charset="0"/>
                 <a:ea typeface="Open Sans" panose="020B0604020202020204" charset="0"/>
                 <a:cs typeface="Open Sans" panose="020B0604020202020204" charset="0"/>
-                <a:hlinkClick r:id="rId4"/>
+                <a:hlinkClick r:id="rId5"/>
               </a:rPr>
               <a:t>http://hdl.handle.net/11234/1-5951</a:t>
             </a:r>
@@ -9940,38 +9904,6 @@
       </p:grpSpPr>
       <p:sp>
         <p:nvSpPr>
-          <p:cNvPr id="3" name="Zástupný symbol pro číslo snímku 2"/>
-          <p:cNvSpPr>
-            <a:spLocks noGrp="1"/>
-          </p:cNvSpPr>
-          <p:nvPr>
-            <p:ph type="sldNum" idx="12"/>
-          </p:nvPr>
-        </p:nvSpPr>
-        <p:spPr/>
-        <p:txBody>
-          <a:bodyPr/>
-          <a:lstStyle/>
-          <a:p>
-            <a:pPr marL="0" lvl="0" indent="0" algn="r" rtl="0">
-              <a:spcBef>
-                <a:spcPts val="0"/>
-              </a:spcBef>
-              <a:spcAft>
-                <a:spcPts val="0"/>
-              </a:spcAft>
-              <a:buNone/>
-            </a:pPr>
-            <a:fld id="{00000000-1234-1234-1234-123412341234}" type="slidenum">
-              <a:rPr lang="en-US" smtClean="0"/>
-              <a:t>15</a:t>
-            </a:fld>
-            <a:endParaRPr lang="en-US" dirty="0"/>
-          </a:p>
-        </p:txBody>
-      </p:sp>
-      <p:sp>
-        <p:nvSpPr>
           <p:cNvPr id="5" name="Nadpis 4"/>
           <p:cNvSpPr>
             <a:spLocks noGrp="1"/>
@@ -10455,15 +10387,39 @@
           </a:p>
         </p:txBody>
       </p:sp>
+      <p:pic>
+        <p:nvPicPr>
+          <p:cNvPr id="7" name="Picture 6"/>
+          <p:cNvPicPr>
+            <a:picLocks noChangeAspect="1"/>
+          </p:cNvPicPr>
+          <p:nvPr/>
+        </p:nvPicPr>
+        <p:blipFill>
+          <a:blip r:embed="rId2"/>
+          <a:stretch>
+            <a:fillRect/>
+          </a:stretch>
+        </p:blipFill>
+        <p:spPr>
+          <a:xfrm>
+            <a:off x="7596336" y="3361208"/>
+            <a:ext cx="1495053" cy="1495053"/>
+          </a:xfrm>
+          <a:prstGeom prst="rect">
+            <a:avLst/>
+          </a:prstGeom>
+        </p:spPr>
+      </p:pic>
       <p:sp>
         <p:nvSpPr>
-          <p:cNvPr id="12" name="TextovéPole 16"/>
+          <p:cNvPr id="8" name="TextovéPole 16"/>
           <p:cNvSpPr txBox="1"/>
           <p:nvPr/>
         </p:nvSpPr>
         <p:spPr>
           <a:xfrm>
-            <a:off x="3995936" y="4856261"/>
+            <a:off x="4355976" y="4856261"/>
             <a:ext cx="4824536" cy="307777"/>
           </a:xfrm>
           <a:prstGeom prst="rect">
@@ -10490,7 +10446,7 @@
                 <a:latin typeface="Open Sans" panose="020B0604020202020204" charset="0"/>
                 <a:ea typeface="Open Sans" panose="020B0604020202020204" charset="0"/>
                 <a:cs typeface="Open Sans" panose="020B0604020202020204" charset="0"/>
-                <a:hlinkClick r:id="rId2"/>
+                <a:hlinkClick r:id="rId3"/>
               </a:rPr>
               <a:t>http://hdl.handle.net/11234/1-5951</a:t>
             </a:r>
@@ -10539,38 +10495,6 @@
           <a:chExt cx="0" cy="0"/>
         </a:xfrm>
       </p:grpSpPr>
-      <p:sp>
-        <p:nvSpPr>
-          <p:cNvPr id="3" name="Zástupný symbol pro číslo snímku 2"/>
-          <p:cNvSpPr>
-            <a:spLocks noGrp="1"/>
-          </p:cNvSpPr>
-          <p:nvPr>
-            <p:ph type="sldNum" idx="12"/>
-          </p:nvPr>
-        </p:nvSpPr>
-        <p:spPr/>
-        <p:txBody>
-          <a:bodyPr/>
-          <a:lstStyle/>
-          <a:p>
-            <a:pPr marL="0" lvl="0" indent="0" algn="r" rtl="0">
-              <a:spcBef>
-                <a:spcPts val="0"/>
-              </a:spcBef>
-              <a:spcAft>
-                <a:spcPts val="0"/>
-              </a:spcAft>
-              <a:buNone/>
-            </a:pPr>
-            <a:fld id="{00000000-1234-1234-1234-123412341234}" type="slidenum">
-              <a:rPr lang="en-US" smtClean="0"/>
-              <a:t>16</a:t>
-            </a:fld>
-            <a:endParaRPr lang="en-US" dirty="0"/>
-          </a:p>
-        </p:txBody>
-      </p:sp>
       <p:sp>
         <p:nvSpPr>
           <p:cNvPr id="5" name="Nadpis 4"/>
@@ -11220,15 +11144,39 @@
           </a:p>
         </p:txBody>
       </p:sp>
+      <p:pic>
+        <p:nvPicPr>
+          <p:cNvPr id="12" name="Picture 11"/>
+          <p:cNvPicPr>
+            <a:picLocks noChangeAspect="1"/>
+          </p:cNvPicPr>
+          <p:nvPr/>
+        </p:nvPicPr>
+        <p:blipFill>
+          <a:blip r:embed="rId2"/>
+          <a:stretch>
+            <a:fillRect/>
+          </a:stretch>
+        </p:blipFill>
+        <p:spPr>
+          <a:xfrm>
+            <a:off x="7596336" y="3361208"/>
+            <a:ext cx="1495053" cy="1495053"/>
+          </a:xfrm>
+          <a:prstGeom prst="rect">
+            <a:avLst/>
+          </a:prstGeom>
+        </p:spPr>
+      </p:pic>
       <p:sp>
         <p:nvSpPr>
-          <p:cNvPr id="10" name="TextovéPole 16"/>
+          <p:cNvPr id="13" name="TextovéPole 16"/>
           <p:cNvSpPr txBox="1"/>
           <p:nvPr/>
         </p:nvSpPr>
         <p:spPr>
           <a:xfrm>
-            <a:off x="3995936" y="4856261"/>
+            <a:off x="4355976" y="4856261"/>
             <a:ext cx="4824536" cy="307777"/>
           </a:xfrm>
           <a:prstGeom prst="rect">
@@ -11255,7 +11203,7 @@
                 <a:latin typeface="Open Sans" panose="020B0604020202020204" charset="0"/>
                 <a:ea typeface="Open Sans" panose="020B0604020202020204" charset="0"/>
                 <a:cs typeface="Open Sans" panose="020B0604020202020204" charset="0"/>
-                <a:hlinkClick r:id="rId2"/>
+                <a:hlinkClick r:id="rId3"/>
               </a:rPr>
               <a:t>http://hdl.handle.net/11234/1-5951</a:t>
             </a:r>
@@ -12325,48 +12273,6 @@
       </p:grpSpPr>
       <p:sp>
         <p:nvSpPr>
-          <p:cNvPr id="58" name="Google Shape;58;p10"/>
-          <p:cNvSpPr txBox="1">
-            <a:spLocks noGrp="1"/>
-          </p:cNvSpPr>
-          <p:nvPr>
-            <p:ph type="sldNum" idx="12"/>
-          </p:nvPr>
-        </p:nvSpPr>
-        <p:spPr>
-          <a:xfrm>
-            <a:off x="8595300" y="4920297"/>
-            <a:ext cx="548700" cy="223200"/>
-          </a:xfrm>
-          <a:prstGeom prst="rect">
-            <a:avLst/>
-          </a:prstGeom>
-        </p:spPr>
-        <p:txBody>
-          <a:bodyPr spcFirstLastPara="1" wrap="square" lIns="91425" tIns="45700" rIns="91425" bIns="45700" anchor="ctr" anchorCtr="0">
-            <a:noAutofit/>
-          </a:bodyPr>
-          <a:lstStyle/>
-          <a:p>
-            <a:pPr marL="0" lvl="0" indent="0" algn="r" rtl="0">
-              <a:spcBef>
-                <a:spcPts val="0"/>
-              </a:spcBef>
-              <a:spcAft>
-                <a:spcPts val="0"/>
-              </a:spcAft>
-              <a:buNone/>
-            </a:pPr>
-            <a:fld id="{00000000-1234-1234-1234-123412341234}" type="slidenum">
-              <a:rPr lang="en-US" smtClean="0"/>
-              <a:t>18</a:t>
-            </a:fld>
-            <a:endParaRPr lang="en-US" dirty="0"/>
-          </a:p>
-        </p:txBody>
-      </p:sp>
-      <p:sp>
-        <p:nvSpPr>
           <p:cNvPr id="59" name="Google Shape;59;p10"/>
           <p:cNvSpPr txBox="1">
             <a:spLocks noGrp="1"/>
@@ -12460,7 +12366,7 @@
         </p:blipFill>
         <p:spPr bwMode="auto">
           <a:xfrm>
-            <a:off x="1803443" y="3442692"/>
+            <a:off x="1619672" y="3442692"/>
             <a:ext cx="6048375" cy="857250"/>
           </a:xfrm>
           <a:prstGeom prst="rect">
@@ -12553,10 +12459,10 @@
         </p:nvGrpSpPr>
         <p:grpSpPr>
           <a:xfrm>
-            <a:off x="6948264" y="1779662"/>
-            <a:ext cx="1368152" cy="2592288"/>
-            <a:chOff x="6948264" y="1779662"/>
-            <a:chExt cx="1368152" cy="2592288"/>
+            <a:off x="6804248" y="1779662"/>
+            <a:ext cx="1512168" cy="2592288"/>
+            <a:chOff x="6804248" y="1779662"/>
+            <a:chExt cx="1512168" cy="2592288"/>
           </a:xfrm>
         </p:grpSpPr>
         <p:sp>
@@ -12705,7 +12611,7 @@
           </p:nvSpPr>
           <p:spPr>
             <a:xfrm>
-              <a:off x="6948264" y="3933056"/>
+              <a:off x="6804248" y="3933056"/>
               <a:ext cx="576064" cy="438894"/>
             </a:xfrm>
             <a:prstGeom prst="ellipse">
@@ -12746,53 +12652,6 @@
       </p:grpSp>
       <p:sp>
         <p:nvSpPr>
-          <p:cNvPr id="17" name="TextovéPole 16"/>
-          <p:cNvSpPr txBox="1"/>
-          <p:nvPr/>
-        </p:nvSpPr>
-        <p:spPr>
-          <a:xfrm>
-            <a:off x="3995936" y="4856261"/>
-            <a:ext cx="4824536" cy="307777"/>
-          </a:xfrm>
-          <a:prstGeom prst="rect">
-            <a:avLst/>
-          </a:prstGeom>
-          <a:noFill/>
-        </p:spPr>
-        <p:txBody>
-          <a:bodyPr wrap="square" rtlCol="0">
-            <a:spAutoFit/>
-          </a:bodyPr>
-          <a:lstStyle/>
-          <a:p>
-            <a:r>
-              <a:rPr lang="en-US" dirty="0" smtClean="0">
-                <a:latin typeface="Open Sans" panose="020B0604020202020204" charset="0"/>
-                <a:ea typeface="Open Sans" panose="020B0604020202020204" charset="0"/>
-                <a:cs typeface="Open Sans" panose="020B0604020202020204" charset="0"/>
-              </a:rPr>
-              <a:t>Download the data: </a:t>
-            </a:r>
-            <a:r>
-              <a:rPr lang="en-US" dirty="0" smtClean="0">
-                <a:latin typeface="Open Sans" panose="020B0604020202020204" charset="0"/>
-                <a:ea typeface="Open Sans" panose="020B0604020202020204" charset="0"/>
-                <a:cs typeface="Open Sans" panose="020B0604020202020204" charset="0"/>
-                <a:hlinkClick r:id="rId5"/>
-              </a:rPr>
-              <a:t>http://hdl.handle.net/11234/1-5951</a:t>
-            </a:r>
-            <a:endParaRPr lang="en-US" dirty="0">
-              <a:latin typeface="Open Sans" panose="020B0604020202020204" charset="0"/>
-              <a:ea typeface="Open Sans" panose="020B0604020202020204" charset="0"/>
-              <a:cs typeface="Open Sans" panose="020B0604020202020204" charset="0"/>
-            </a:endParaRPr>
-          </a:p>
-        </p:txBody>
-      </p:sp>
-      <p:sp>
-        <p:nvSpPr>
           <p:cNvPr id="16" name="Google Shape;57;p10"/>
           <p:cNvSpPr txBox="1">
             <a:spLocks noGrp="1"/>
@@ -12973,6 +12832,77 @@
               <a:t> Manual annotation (inter-annotator agreement):</a:t>
             </a:r>
             <a:endParaRPr lang="en-US" sz="1600" dirty="0">
+              <a:latin typeface="Open Sans" panose="020B0604020202020204" charset="0"/>
+              <a:ea typeface="Open Sans" panose="020B0604020202020204" charset="0"/>
+              <a:cs typeface="Open Sans" panose="020B0604020202020204" charset="0"/>
+            </a:endParaRPr>
+          </a:p>
+        </p:txBody>
+      </p:sp>
+      <p:pic>
+        <p:nvPicPr>
+          <p:cNvPr id="20" name="Picture 19"/>
+          <p:cNvPicPr>
+            <a:picLocks noChangeAspect="1"/>
+          </p:cNvPicPr>
+          <p:nvPr/>
+        </p:nvPicPr>
+        <p:blipFill>
+          <a:blip r:embed="rId5"/>
+          <a:stretch>
+            <a:fillRect/>
+          </a:stretch>
+        </p:blipFill>
+        <p:spPr>
+          <a:xfrm>
+            <a:off x="7596336" y="3361208"/>
+            <a:ext cx="1495053" cy="1495053"/>
+          </a:xfrm>
+          <a:prstGeom prst="rect">
+            <a:avLst/>
+          </a:prstGeom>
+        </p:spPr>
+      </p:pic>
+      <p:sp>
+        <p:nvSpPr>
+          <p:cNvPr id="21" name="TextovéPole 16"/>
+          <p:cNvSpPr txBox="1"/>
+          <p:nvPr/>
+        </p:nvSpPr>
+        <p:spPr>
+          <a:xfrm>
+            <a:off x="4355976" y="4856261"/>
+            <a:ext cx="4824536" cy="307777"/>
+          </a:xfrm>
+          <a:prstGeom prst="rect">
+            <a:avLst/>
+          </a:prstGeom>
+          <a:noFill/>
+        </p:spPr>
+        <p:txBody>
+          <a:bodyPr wrap="square" rtlCol="0">
+            <a:spAutoFit/>
+          </a:bodyPr>
+          <a:lstStyle/>
+          <a:p>
+            <a:r>
+              <a:rPr lang="en-US" dirty="0" smtClean="0">
+                <a:latin typeface="Open Sans" panose="020B0604020202020204" charset="0"/>
+                <a:ea typeface="Open Sans" panose="020B0604020202020204" charset="0"/>
+                <a:cs typeface="Open Sans" panose="020B0604020202020204" charset="0"/>
+              </a:rPr>
+              <a:t>Download the data: </a:t>
+            </a:r>
+            <a:r>
+              <a:rPr lang="en-US" dirty="0" smtClean="0">
+                <a:latin typeface="Open Sans" panose="020B0604020202020204" charset="0"/>
+                <a:ea typeface="Open Sans" panose="020B0604020202020204" charset="0"/>
+                <a:cs typeface="Open Sans" panose="020B0604020202020204" charset="0"/>
+                <a:hlinkClick r:id="rId6"/>
+              </a:rPr>
+              <a:t>http://hdl.handle.net/11234/1-5951</a:t>
+            </a:r>
+            <a:endParaRPr lang="en-US" dirty="0">
               <a:latin typeface="Open Sans" panose="020B0604020202020204" charset="0"/>
               <a:ea typeface="Open Sans" panose="020B0604020202020204" charset="0"/>
               <a:cs typeface="Open Sans" panose="020B0604020202020204" charset="0"/>
@@ -13019,48 +12949,6 @@
       </p:grpSpPr>
       <p:sp>
         <p:nvSpPr>
-          <p:cNvPr id="58" name="Google Shape;58;p10"/>
-          <p:cNvSpPr txBox="1">
-            <a:spLocks noGrp="1"/>
-          </p:cNvSpPr>
-          <p:nvPr>
-            <p:ph type="sldNum" idx="12"/>
-          </p:nvPr>
-        </p:nvSpPr>
-        <p:spPr>
-          <a:xfrm>
-            <a:off x="8595300" y="4920297"/>
-            <a:ext cx="548700" cy="223200"/>
-          </a:xfrm>
-          <a:prstGeom prst="rect">
-            <a:avLst/>
-          </a:prstGeom>
-        </p:spPr>
-        <p:txBody>
-          <a:bodyPr spcFirstLastPara="1" wrap="square" lIns="91425" tIns="45700" rIns="91425" bIns="45700" anchor="ctr" anchorCtr="0">
-            <a:noAutofit/>
-          </a:bodyPr>
-          <a:lstStyle/>
-          <a:p>
-            <a:pPr marL="0" lvl="0" indent="0" algn="r" rtl="0">
-              <a:spcBef>
-                <a:spcPts val="0"/>
-              </a:spcBef>
-              <a:spcAft>
-                <a:spcPts val="0"/>
-              </a:spcAft>
-              <a:buNone/>
-            </a:pPr>
-            <a:fld id="{00000000-1234-1234-1234-123412341234}" type="slidenum">
-              <a:rPr lang="en-US" smtClean="0"/>
-              <a:t>19</a:t>
-            </a:fld>
-            <a:endParaRPr lang="en-US" dirty="0"/>
-          </a:p>
-        </p:txBody>
-      </p:sp>
-      <p:sp>
-        <p:nvSpPr>
           <p:cNvPr id="59" name="Google Shape;59;p10"/>
           <p:cNvSpPr txBox="1">
             <a:spLocks noGrp="1"/>
@@ -13180,53 +13068,6 @@
           </a:p>
         </p:txBody>
       </p:sp>
-      <p:sp>
-        <p:nvSpPr>
-          <p:cNvPr id="18" name="TextovéPole 16"/>
-          <p:cNvSpPr txBox="1"/>
-          <p:nvPr/>
-        </p:nvSpPr>
-        <p:spPr>
-          <a:xfrm>
-            <a:off x="3995936" y="4856261"/>
-            <a:ext cx="4824536" cy="307777"/>
-          </a:xfrm>
-          <a:prstGeom prst="rect">
-            <a:avLst/>
-          </a:prstGeom>
-          <a:noFill/>
-        </p:spPr>
-        <p:txBody>
-          <a:bodyPr wrap="square" rtlCol="0">
-            <a:spAutoFit/>
-          </a:bodyPr>
-          <a:lstStyle/>
-          <a:p>
-            <a:r>
-              <a:rPr lang="en-US" dirty="0" smtClean="0">
-                <a:latin typeface="Open Sans" panose="020B0604020202020204" charset="0"/>
-                <a:ea typeface="Open Sans" panose="020B0604020202020204" charset="0"/>
-                <a:cs typeface="Open Sans" panose="020B0604020202020204" charset="0"/>
-              </a:rPr>
-              <a:t>Download the data: </a:t>
-            </a:r>
-            <a:r>
-              <a:rPr lang="en-US" dirty="0" smtClean="0">
-                <a:latin typeface="Open Sans" panose="020B0604020202020204" charset="0"/>
-                <a:ea typeface="Open Sans" panose="020B0604020202020204" charset="0"/>
-                <a:cs typeface="Open Sans" panose="020B0604020202020204" charset="0"/>
-                <a:hlinkClick r:id="rId3"/>
-              </a:rPr>
-              <a:t>http://hdl.handle.net/11234/1-5951</a:t>
-            </a:r>
-            <a:endParaRPr lang="en-US" dirty="0">
-              <a:latin typeface="Open Sans" panose="020B0604020202020204" charset="0"/>
-              <a:ea typeface="Open Sans" panose="020B0604020202020204" charset="0"/>
-              <a:cs typeface="Open Sans" panose="020B0604020202020204" charset="0"/>
-            </a:endParaRPr>
-          </a:p>
-        </p:txBody>
-      </p:sp>
       <p:grpSp>
         <p:nvGrpSpPr>
           <p:cNvPr id="4" name="Group 3"/>
@@ -13250,7 +13091,7 @@
             <p:nvPr/>
           </p:nvPicPr>
           <p:blipFill>
-            <a:blip r:embed="rId4">
+            <a:blip r:embed="rId3">
               <a:extLst>
                 <a:ext uri="{28A0092B-C50C-407E-A947-70E740481C1C}">
                   <a14:useLocalDpi xmlns:a14="http://schemas.microsoft.com/office/drawing/2010/main" val="0"/>
@@ -13352,7 +13193,7 @@
         </p:nvGrpSpPr>
         <p:grpSpPr>
           <a:xfrm>
-            <a:off x="1807418" y="3471267"/>
+            <a:off x="1619672" y="3471267"/>
             <a:ext cx="6076950" cy="828675"/>
             <a:chOff x="1807418" y="3471267"/>
             <a:chExt cx="6076950" cy="828675"/>
@@ -13367,7 +13208,7 @@
             <p:nvPr/>
           </p:nvPicPr>
           <p:blipFill>
-            <a:blip r:embed="rId5">
+            <a:blip r:embed="rId4">
               <a:extLst>
                 <a:ext uri="{28A0092B-C50C-407E-A947-70E740481C1C}">
                   <a14:useLocalDpi xmlns:a14="http://schemas.microsoft.com/office/drawing/2010/main" val="0"/>
@@ -13469,10 +13310,10 @@
         </p:nvGrpSpPr>
         <p:grpSpPr>
           <a:xfrm>
-            <a:off x="6948264" y="1779662"/>
-            <a:ext cx="1368152" cy="2592288"/>
-            <a:chOff x="6948264" y="1779662"/>
-            <a:chExt cx="1368152" cy="2592288"/>
+            <a:off x="6804248" y="1779662"/>
+            <a:ext cx="1512168" cy="2592288"/>
+            <a:chOff x="6804248" y="1779662"/>
+            <a:chExt cx="1512168" cy="2592288"/>
           </a:xfrm>
         </p:grpSpPr>
         <p:sp>
@@ -13621,7 +13462,7 @@
           </p:nvSpPr>
           <p:spPr>
             <a:xfrm>
-              <a:off x="6948264" y="3933056"/>
+              <a:off x="6804248" y="3933056"/>
               <a:ext cx="576064" cy="438894"/>
             </a:xfrm>
             <a:prstGeom prst="ellipse">
@@ -13797,6 +13638,77 @@
               <a:t> Manual annotation (inter-annotator agreement):</a:t>
             </a:r>
             <a:endParaRPr lang="en-US" sz="1600" dirty="0">
+              <a:latin typeface="Open Sans" panose="020B0604020202020204" charset="0"/>
+              <a:ea typeface="Open Sans" panose="020B0604020202020204" charset="0"/>
+              <a:cs typeface="Open Sans" panose="020B0604020202020204" charset="0"/>
+            </a:endParaRPr>
+          </a:p>
+        </p:txBody>
+      </p:sp>
+      <p:pic>
+        <p:nvPicPr>
+          <p:cNvPr id="22" name="Picture 21"/>
+          <p:cNvPicPr>
+            <a:picLocks noChangeAspect="1"/>
+          </p:cNvPicPr>
+          <p:nvPr/>
+        </p:nvPicPr>
+        <p:blipFill>
+          <a:blip r:embed="rId5"/>
+          <a:stretch>
+            <a:fillRect/>
+          </a:stretch>
+        </p:blipFill>
+        <p:spPr>
+          <a:xfrm>
+            <a:off x="7596336" y="3361208"/>
+            <a:ext cx="1495053" cy="1495053"/>
+          </a:xfrm>
+          <a:prstGeom prst="rect">
+            <a:avLst/>
+          </a:prstGeom>
+        </p:spPr>
+      </p:pic>
+      <p:sp>
+        <p:nvSpPr>
+          <p:cNvPr id="23" name="TextovéPole 16"/>
+          <p:cNvSpPr txBox="1"/>
+          <p:nvPr/>
+        </p:nvSpPr>
+        <p:spPr>
+          <a:xfrm>
+            <a:off x="4355976" y="4856261"/>
+            <a:ext cx="4824536" cy="307777"/>
+          </a:xfrm>
+          <a:prstGeom prst="rect">
+            <a:avLst/>
+          </a:prstGeom>
+          <a:noFill/>
+        </p:spPr>
+        <p:txBody>
+          <a:bodyPr wrap="square" rtlCol="0">
+            <a:spAutoFit/>
+          </a:bodyPr>
+          <a:lstStyle/>
+          <a:p>
+            <a:r>
+              <a:rPr lang="en-US" dirty="0" smtClean="0">
+                <a:latin typeface="Open Sans" panose="020B0604020202020204" charset="0"/>
+                <a:ea typeface="Open Sans" panose="020B0604020202020204" charset="0"/>
+                <a:cs typeface="Open Sans" panose="020B0604020202020204" charset="0"/>
+              </a:rPr>
+              <a:t>Download the data: </a:t>
+            </a:r>
+            <a:r>
+              <a:rPr lang="en-US" dirty="0" smtClean="0">
+                <a:latin typeface="Open Sans" panose="020B0604020202020204" charset="0"/>
+                <a:ea typeface="Open Sans" panose="020B0604020202020204" charset="0"/>
+                <a:cs typeface="Open Sans" panose="020B0604020202020204" charset="0"/>
+                <a:hlinkClick r:id="rId6"/>
+              </a:rPr>
+              <a:t>http://hdl.handle.net/11234/1-5951</a:t>
+            </a:r>
+            <a:endParaRPr lang="en-US" dirty="0">
               <a:latin typeface="Open Sans" panose="020B0604020202020204" charset="0"/>
               <a:ea typeface="Open Sans" panose="020B0604020202020204" charset="0"/>
               <a:cs typeface="Open Sans" panose="020B0604020202020204" charset="0"/>
@@ -14355,48 +14267,6 @@
       </p:grpSpPr>
       <p:sp>
         <p:nvSpPr>
-          <p:cNvPr id="58" name="Google Shape;58;p10"/>
-          <p:cNvSpPr txBox="1">
-            <a:spLocks noGrp="1"/>
-          </p:cNvSpPr>
-          <p:nvPr>
-            <p:ph type="sldNum" idx="12"/>
-          </p:nvPr>
-        </p:nvSpPr>
-        <p:spPr>
-          <a:xfrm>
-            <a:off x="8595300" y="4920297"/>
-            <a:ext cx="548700" cy="223200"/>
-          </a:xfrm>
-          <a:prstGeom prst="rect">
-            <a:avLst/>
-          </a:prstGeom>
-        </p:spPr>
-        <p:txBody>
-          <a:bodyPr spcFirstLastPara="1" wrap="square" lIns="91425" tIns="45700" rIns="91425" bIns="45700" anchor="ctr" anchorCtr="0">
-            <a:noAutofit/>
-          </a:bodyPr>
-          <a:lstStyle/>
-          <a:p>
-            <a:pPr marL="0" lvl="0" indent="0" algn="r" rtl="0">
-              <a:spcBef>
-                <a:spcPts val="0"/>
-              </a:spcBef>
-              <a:spcAft>
-                <a:spcPts val="0"/>
-              </a:spcAft>
-              <a:buNone/>
-            </a:pPr>
-            <a:fld id="{00000000-1234-1234-1234-123412341234}" type="slidenum">
-              <a:rPr lang="en-US" smtClean="0"/>
-              <a:t>20</a:t>
-            </a:fld>
-            <a:endParaRPr lang="en-US" dirty="0"/>
-          </a:p>
-        </p:txBody>
-      </p:sp>
-      <p:sp>
-        <p:nvSpPr>
           <p:cNvPr id="59" name="Google Shape;59;p10"/>
           <p:cNvSpPr txBox="1">
             <a:spLocks noGrp="1"/>
@@ -14512,53 +14382,6 @@
           </a:p>
         </p:txBody>
       </p:sp>
-      <p:sp>
-        <p:nvSpPr>
-          <p:cNvPr id="18" name="TextovéPole 16"/>
-          <p:cNvSpPr txBox="1"/>
-          <p:nvPr/>
-        </p:nvSpPr>
-        <p:spPr>
-          <a:xfrm>
-            <a:off x="3995936" y="4856261"/>
-            <a:ext cx="4824536" cy="307777"/>
-          </a:xfrm>
-          <a:prstGeom prst="rect">
-            <a:avLst/>
-          </a:prstGeom>
-          <a:noFill/>
-        </p:spPr>
-        <p:txBody>
-          <a:bodyPr wrap="square" rtlCol="0">
-            <a:spAutoFit/>
-          </a:bodyPr>
-          <a:lstStyle/>
-          <a:p>
-            <a:r>
-              <a:rPr lang="en-US" dirty="0" smtClean="0">
-                <a:latin typeface="Open Sans" panose="020B0604020202020204" charset="0"/>
-                <a:ea typeface="Open Sans" panose="020B0604020202020204" charset="0"/>
-                <a:cs typeface="Open Sans" panose="020B0604020202020204" charset="0"/>
-              </a:rPr>
-              <a:t>Download the data: </a:t>
-            </a:r>
-            <a:r>
-              <a:rPr lang="en-US" dirty="0" smtClean="0">
-                <a:latin typeface="Open Sans" panose="020B0604020202020204" charset="0"/>
-                <a:ea typeface="Open Sans" panose="020B0604020202020204" charset="0"/>
-                <a:cs typeface="Open Sans" panose="020B0604020202020204" charset="0"/>
-                <a:hlinkClick r:id="rId3"/>
-              </a:rPr>
-              <a:t>http://hdl.handle.net/11234/1-5951</a:t>
-            </a:r>
-            <a:endParaRPr lang="en-US" dirty="0">
-              <a:latin typeface="Open Sans" panose="020B0604020202020204" charset="0"/>
-              <a:ea typeface="Open Sans" panose="020B0604020202020204" charset="0"/>
-              <a:cs typeface="Open Sans" panose="020B0604020202020204" charset="0"/>
-            </a:endParaRPr>
-          </a:p>
-        </p:txBody>
-      </p:sp>
       <p:grpSp>
         <p:nvGrpSpPr>
           <p:cNvPr id="3" name="Group 2"/>
@@ -14582,7 +14405,7 @@
             <p:nvPr/>
           </p:nvPicPr>
           <p:blipFill>
-            <a:blip r:embed="rId4">
+            <a:blip r:embed="rId3">
               <a:extLst>
                 <a:ext uri="{28A0092B-C50C-407E-A947-70E740481C1C}">
                   <a14:useLocalDpi xmlns:a14="http://schemas.microsoft.com/office/drawing/2010/main" val="0"/>
@@ -14684,7 +14507,7 @@
         </p:nvGrpSpPr>
         <p:grpSpPr>
           <a:xfrm>
-            <a:off x="1815369" y="3480792"/>
+            <a:off x="1619672" y="3480792"/>
             <a:ext cx="6076950" cy="819150"/>
             <a:chOff x="1815369" y="3480792"/>
             <a:chExt cx="6076950" cy="819150"/>
@@ -14699,7 +14522,7 @@
             <p:nvPr/>
           </p:nvPicPr>
           <p:blipFill>
-            <a:blip r:embed="rId5">
+            <a:blip r:embed="rId4">
               <a:extLst>
                 <a:ext uri="{28A0092B-C50C-407E-A947-70E740481C1C}">
                   <a14:useLocalDpi xmlns:a14="http://schemas.microsoft.com/office/drawing/2010/main" val="0"/>
@@ -14801,10 +14624,10 @@
         </p:nvGrpSpPr>
         <p:grpSpPr>
           <a:xfrm>
-            <a:off x="6948264" y="1779662"/>
-            <a:ext cx="1368152" cy="2592288"/>
-            <a:chOff x="6948264" y="1779662"/>
-            <a:chExt cx="1368152" cy="2592288"/>
+            <a:off x="6804248" y="1779662"/>
+            <a:ext cx="1512168" cy="2592288"/>
+            <a:chOff x="6804248" y="1779662"/>
+            <a:chExt cx="1512168" cy="2592288"/>
           </a:xfrm>
         </p:grpSpPr>
         <p:sp>
@@ -14953,7 +14776,7 @@
           </p:nvSpPr>
           <p:spPr>
             <a:xfrm>
-              <a:off x="6948264" y="3933056"/>
+              <a:off x="6804248" y="3933056"/>
               <a:ext cx="576064" cy="438894"/>
             </a:xfrm>
             <a:prstGeom prst="ellipse">
@@ -15129,6 +14952,77 @@
               <a:t> Manual annotation (inter-annotator agreement):</a:t>
             </a:r>
             <a:endParaRPr lang="en-US" sz="1600" dirty="0">
+              <a:latin typeface="Open Sans" panose="020B0604020202020204" charset="0"/>
+              <a:ea typeface="Open Sans" panose="020B0604020202020204" charset="0"/>
+              <a:cs typeface="Open Sans" panose="020B0604020202020204" charset="0"/>
+            </a:endParaRPr>
+          </a:p>
+        </p:txBody>
+      </p:sp>
+      <p:pic>
+        <p:nvPicPr>
+          <p:cNvPr id="23" name="Picture 22"/>
+          <p:cNvPicPr>
+            <a:picLocks noChangeAspect="1"/>
+          </p:cNvPicPr>
+          <p:nvPr/>
+        </p:nvPicPr>
+        <p:blipFill>
+          <a:blip r:embed="rId5"/>
+          <a:stretch>
+            <a:fillRect/>
+          </a:stretch>
+        </p:blipFill>
+        <p:spPr>
+          <a:xfrm>
+            <a:off x="7596336" y="3361208"/>
+            <a:ext cx="1495053" cy="1495053"/>
+          </a:xfrm>
+          <a:prstGeom prst="rect">
+            <a:avLst/>
+          </a:prstGeom>
+        </p:spPr>
+      </p:pic>
+      <p:sp>
+        <p:nvSpPr>
+          <p:cNvPr id="24" name="TextovéPole 16"/>
+          <p:cNvSpPr txBox="1"/>
+          <p:nvPr/>
+        </p:nvSpPr>
+        <p:spPr>
+          <a:xfrm>
+            <a:off x="4355976" y="4856261"/>
+            <a:ext cx="4824536" cy="307777"/>
+          </a:xfrm>
+          <a:prstGeom prst="rect">
+            <a:avLst/>
+          </a:prstGeom>
+          <a:noFill/>
+        </p:spPr>
+        <p:txBody>
+          <a:bodyPr wrap="square" rtlCol="0">
+            <a:spAutoFit/>
+          </a:bodyPr>
+          <a:lstStyle/>
+          <a:p>
+            <a:r>
+              <a:rPr lang="en-US" dirty="0" smtClean="0">
+                <a:latin typeface="Open Sans" panose="020B0604020202020204" charset="0"/>
+                <a:ea typeface="Open Sans" panose="020B0604020202020204" charset="0"/>
+                <a:cs typeface="Open Sans" panose="020B0604020202020204" charset="0"/>
+              </a:rPr>
+              <a:t>Download the data: </a:t>
+            </a:r>
+            <a:r>
+              <a:rPr lang="en-US" dirty="0" smtClean="0">
+                <a:latin typeface="Open Sans" panose="020B0604020202020204" charset="0"/>
+                <a:ea typeface="Open Sans" panose="020B0604020202020204" charset="0"/>
+                <a:cs typeface="Open Sans" panose="020B0604020202020204" charset="0"/>
+                <a:hlinkClick r:id="rId6"/>
+              </a:rPr>
+              <a:t>http://hdl.handle.net/11234/1-5951</a:t>
+            </a:r>
+            <a:endParaRPr lang="en-US" dirty="0">
               <a:latin typeface="Open Sans" panose="020B0604020202020204" charset="0"/>
               <a:ea typeface="Open Sans" panose="020B0604020202020204" charset="0"/>
               <a:cs typeface="Open Sans" panose="020B0604020202020204" charset="0"/>
@@ -15341,70 +15235,36 @@
             </a:pPr>
             <a:r>
               <a:rPr lang="en-US" dirty="0" smtClean="0"/>
-              <a:t>automatic conversion as an essential first step to reduce costs for full manual annotation</a:t>
+              <a:t>automatic conversion as an essential first step to reduce </a:t>
+            </a:r>
+            <a:r>
+              <a:rPr lang="cs-CZ" dirty="0" smtClean="0"/>
+              <a:t>	</a:t>
+            </a:r>
+            <a:r>
+              <a:rPr lang="cs-CZ" dirty="0" smtClean="0"/>
+              <a:t>           </a:t>
+            </a:r>
+            <a:r>
+              <a:rPr lang="en-US" dirty="0" smtClean="0"/>
+              <a:t>costs</a:t>
+            </a:r>
+            <a:r>
+              <a:rPr lang="cs-CZ" dirty="0" smtClean="0"/>
+              <a:t> </a:t>
+            </a:r>
+            <a:r>
+              <a:rPr lang="en-US" dirty="0" smtClean="0"/>
+              <a:t>for </a:t>
+            </a:r>
+            <a:r>
+              <a:rPr lang="en-US" dirty="0" smtClean="0"/>
+              <a:t>full manual annotation</a:t>
             </a:r>
             <a:endParaRPr lang="en-US" dirty="0">
               <a:solidFill>
                 <a:srgbClr val="FF0000"/>
               </a:solidFill>
-            </a:endParaRPr>
-          </a:p>
-        </p:txBody>
-      </p:sp>
-      <p:sp>
-        <p:nvSpPr>
-          <p:cNvPr id="96" name="Google Shape;96;p14"/>
-          <p:cNvSpPr txBox="1">
-            <a:spLocks noGrp="1"/>
-          </p:cNvSpPr>
-          <p:nvPr>
-            <p:ph type="sldNum" idx="12"/>
-          </p:nvPr>
-        </p:nvSpPr>
-        <p:spPr>
-          <a:xfrm>
-            <a:off x="8595300" y="4835723"/>
-            <a:ext cx="548700" cy="393600"/>
-          </a:xfrm>
-          <a:prstGeom prst="rect">
-            <a:avLst/>
-          </a:prstGeom>
-        </p:spPr>
-        <p:txBody>
-          <a:bodyPr spcFirstLastPara="1" wrap="square" lIns="91425" tIns="91425" rIns="91425" bIns="91425" anchor="ctr" anchorCtr="0">
-            <a:noAutofit/>
-          </a:bodyPr>
-          <a:lstStyle/>
-          <a:p>
-            <a:pPr marL="0" lvl="0" indent="0" algn="r" rtl="0">
-              <a:spcBef>
-                <a:spcPts val="0"/>
-              </a:spcBef>
-              <a:spcAft>
-                <a:spcPts val="0"/>
-              </a:spcAft>
-              <a:buNone/>
-            </a:pPr>
-            <a:fld id="{00000000-1234-1234-1234-123412341234}" type="slidenum">
-              <a:rPr lang="en-US" smtClean="0">
-                <a:solidFill>
-                  <a:schemeClr val="dk2"/>
-                </a:solidFill>
-                <a:latin typeface="Arial"/>
-                <a:ea typeface="Arial"/>
-                <a:cs typeface="Arial"/>
-                <a:sym typeface="Arial"/>
-              </a:rPr>
-              <a:t>21</a:t>
-            </a:fld>
-            <a:endParaRPr lang="en-US" dirty="0">
-              <a:solidFill>
-                <a:schemeClr val="dk2"/>
-              </a:solidFill>
-              <a:latin typeface="Arial"/>
-              <a:ea typeface="Arial"/>
-              <a:cs typeface="Arial"/>
-              <a:sym typeface="Arial"/>
             </a:endParaRPr>
           </a:p>
         </p:txBody>
@@ -15498,13 +15358,13 @@
       </p:sp>
       <p:sp>
         <p:nvSpPr>
-          <p:cNvPr id="7" name="TextovéPole 16"/>
+          <p:cNvPr id="10" name="TextovéPole 16"/>
           <p:cNvSpPr txBox="1"/>
           <p:nvPr/>
         </p:nvSpPr>
         <p:spPr>
           <a:xfrm>
-            <a:off x="3995936" y="4856261"/>
+            <a:off x="4355976" y="4856261"/>
             <a:ext cx="4824536" cy="307777"/>
           </a:xfrm>
           <a:prstGeom prst="rect">
@@ -15543,6 +15403,30 @@
           </a:p>
         </p:txBody>
       </p:sp>
+      <p:pic>
+        <p:nvPicPr>
+          <p:cNvPr id="8" name="Picture 7"/>
+          <p:cNvPicPr>
+            <a:picLocks noChangeAspect="1"/>
+          </p:cNvPicPr>
+          <p:nvPr/>
+        </p:nvPicPr>
+        <p:blipFill>
+          <a:blip r:embed="rId4"/>
+          <a:stretch>
+            <a:fillRect/>
+          </a:stretch>
+        </p:blipFill>
+        <p:spPr>
+          <a:xfrm>
+            <a:off x="7596336" y="3361208"/>
+            <a:ext cx="1495053" cy="1495053"/>
+          </a:xfrm>
+          <a:prstGeom prst="rect">
+            <a:avLst/>
+          </a:prstGeom>
+        </p:spPr>
+      </p:pic>
     </p:spTree>
   </p:cSld>
   <p:clrMapOvr>
@@ -15597,7 +15481,7 @@
           <a:graphicData uri="http://schemas.openxmlformats.org/presentationml/2006/ole">
             <mc:AlternateContent xmlns:mc="http://schemas.openxmlformats.org/markup-compatibility/2006">
               <mc:Choice xmlns:v="urn:schemas-microsoft-com:vml" Requires="v">
-                <p:oleObj spid="_x0000_s8265" name="Acrobat Document" r:id="rId4" imgW="4400418" imgH="2533650" progId="AcroExch.Document.DC">
+                <p:oleObj spid="_x0000_s8269" name="Acrobat Document" r:id="rId4" imgW="4400418" imgH="2533650" progId="AcroExch.Document.DC">
                   <p:embed/>
                 </p:oleObj>
               </mc:Choice>
@@ -16120,6 +16004,30 @@
               </a14:hiddenFill>
             </a:ext>
           </a:extLst>
+        </p:spPr>
+      </p:pic>
+      <p:pic>
+        <p:nvPicPr>
+          <p:cNvPr id="9" name="Picture 8"/>
+          <p:cNvPicPr>
+            <a:picLocks noChangeAspect="1"/>
+          </p:cNvPicPr>
+          <p:nvPr/>
+        </p:nvPicPr>
+        <p:blipFill>
+          <a:blip r:embed="rId9"/>
+          <a:stretch>
+            <a:fillRect/>
+          </a:stretch>
+        </p:blipFill>
+        <p:spPr>
+          <a:xfrm>
+            <a:off x="5868144" y="3175599"/>
+            <a:ext cx="2076469" cy="2076469"/>
+          </a:xfrm>
+          <a:prstGeom prst="rect">
+            <a:avLst/>
+          </a:prstGeom>
         </p:spPr>
       </p:pic>
     </p:spTree>

</xml_diff>